<commit_message>
Updated Slide 4 to correct minor spelling mistake
</commit_message>
<xml_diff>
--- a/Slides/AI Part 4.pptx
+++ b/Slides/AI Part 4.pptx
@@ -375,7 +375,7 @@
           <a:p>
             <a:fld id="{1CB4F8C3-C35B-45B2-9972-EFDDC647E9A4}" type="datetimeFigureOut">
               <a:rPr lang="en-GB" smtClean="0"/>
-              <a:t>03/06/2022</a:t>
+              <a:t>07/06/2022</a:t>
             </a:fld>
             <a:endParaRPr lang="en-GB"/>
           </a:p>
@@ -575,7 +575,7 @@
           <a:p>
             <a:fld id="{1CB4F8C3-C35B-45B2-9972-EFDDC647E9A4}" type="datetimeFigureOut">
               <a:rPr lang="en-GB" smtClean="0"/>
-              <a:t>03/06/2022</a:t>
+              <a:t>07/06/2022</a:t>
             </a:fld>
             <a:endParaRPr lang="en-GB"/>
           </a:p>
@@ -785,7 +785,7 @@
           <a:p>
             <a:fld id="{1CB4F8C3-C35B-45B2-9972-EFDDC647E9A4}" type="datetimeFigureOut">
               <a:rPr lang="en-GB" smtClean="0"/>
-              <a:t>03/06/2022</a:t>
+              <a:t>07/06/2022</a:t>
             </a:fld>
             <a:endParaRPr lang="en-GB"/>
           </a:p>
@@ -1021,7 +1021,7 @@
           <a:p>
             <a:fld id="{6C21EC1F-9507-4D27-9C64-015C1F72ED4D}" type="datetimeFigureOut">
               <a:rPr lang="en-GB" smtClean="0"/>
-              <a:t>03/06/2022</a:t>
+              <a:t>07/06/2022</a:t>
             </a:fld>
             <a:endParaRPr lang="en-GB"/>
           </a:p>
@@ -1191,7 +1191,7 @@
           <a:p>
             <a:fld id="{6C21EC1F-9507-4D27-9C64-015C1F72ED4D}" type="datetimeFigureOut">
               <a:rPr lang="en-GB" smtClean="0"/>
-              <a:t>03/06/2022</a:t>
+              <a:t>07/06/2022</a:t>
             </a:fld>
             <a:endParaRPr lang="en-GB"/>
           </a:p>
@@ -1459,7 +1459,7 @@
           <a:p>
             <a:fld id="{6C21EC1F-9507-4D27-9C64-015C1F72ED4D}" type="datetimeFigureOut">
               <a:rPr lang="en-GB" smtClean="0"/>
-              <a:t>03/06/2022</a:t>
+              <a:t>07/06/2022</a:t>
             </a:fld>
             <a:endParaRPr lang="en-GB"/>
           </a:p>
@@ -1691,7 +1691,7 @@
           <a:p>
             <a:fld id="{6C21EC1F-9507-4D27-9C64-015C1F72ED4D}" type="datetimeFigureOut">
               <a:rPr lang="en-GB" smtClean="0"/>
-              <a:t>03/06/2022</a:t>
+              <a:t>07/06/2022</a:t>
             </a:fld>
             <a:endParaRPr lang="en-GB"/>
           </a:p>
@@ -2050,7 +2050,7 @@
           <a:p>
             <a:fld id="{6C21EC1F-9507-4D27-9C64-015C1F72ED4D}" type="datetimeFigureOut">
               <a:rPr lang="en-GB" smtClean="0"/>
-              <a:t>03/06/2022</a:t>
+              <a:t>07/06/2022</a:t>
             </a:fld>
             <a:endParaRPr lang="en-GB"/>
           </a:p>
@@ -2191,7 +2191,7 @@
           <a:p>
             <a:fld id="{6C21EC1F-9507-4D27-9C64-015C1F72ED4D}" type="datetimeFigureOut">
               <a:rPr lang="en-GB" smtClean="0"/>
-              <a:t>03/06/2022</a:t>
+              <a:t>07/06/2022</a:t>
             </a:fld>
             <a:endParaRPr lang="en-GB"/>
           </a:p>
@@ -2286,7 +2286,7 @@
           <a:p>
             <a:fld id="{6C21EC1F-9507-4D27-9C64-015C1F72ED4D}" type="datetimeFigureOut">
               <a:rPr lang="en-GB" smtClean="0"/>
-              <a:t>03/06/2022</a:t>
+              <a:t>07/06/2022</a:t>
             </a:fld>
             <a:endParaRPr lang="en-GB"/>
           </a:p>
@@ -2643,7 +2643,7 @@
           <a:p>
             <a:fld id="{6C21EC1F-9507-4D27-9C64-015C1F72ED4D}" type="datetimeFigureOut">
               <a:rPr lang="en-GB" smtClean="0"/>
-              <a:t>03/06/2022</a:t>
+              <a:t>07/06/2022</a:t>
             </a:fld>
             <a:endParaRPr lang="en-GB"/>
           </a:p>
@@ -2846,7 +2846,7 @@
           <a:p>
             <a:fld id="{1CB4F8C3-C35B-45B2-9972-EFDDC647E9A4}" type="datetimeFigureOut">
               <a:rPr lang="en-GB" smtClean="0"/>
-              <a:t>03/06/2022</a:t>
+              <a:t>07/06/2022</a:t>
             </a:fld>
             <a:endParaRPr lang="en-GB"/>
           </a:p>
@@ -3200,7 +3200,7 @@
           <a:p>
             <a:fld id="{6C21EC1F-9507-4D27-9C64-015C1F72ED4D}" type="datetimeFigureOut">
               <a:rPr lang="en-GB" smtClean="0"/>
-              <a:t>03/06/2022</a:t>
+              <a:t>07/06/2022</a:t>
             </a:fld>
             <a:endParaRPr lang="en-GB"/>
           </a:p>
@@ -3385,7 +3385,7 @@
           <a:p>
             <a:fld id="{6C21EC1F-9507-4D27-9C64-015C1F72ED4D}" type="datetimeFigureOut">
               <a:rPr lang="en-GB" smtClean="0"/>
-              <a:t>03/06/2022</a:t>
+              <a:t>07/06/2022</a:t>
             </a:fld>
             <a:endParaRPr lang="en-GB"/>
           </a:p>
@@ -3565,7 +3565,7 @@
           <a:p>
             <a:fld id="{6C21EC1F-9507-4D27-9C64-015C1F72ED4D}" type="datetimeFigureOut">
               <a:rPr lang="en-GB" smtClean="0"/>
-              <a:t>03/06/2022</a:t>
+              <a:t>07/06/2022</a:t>
             </a:fld>
             <a:endParaRPr lang="en-GB"/>
           </a:p>
@@ -3829,7 +3829,7 @@
           <a:p>
             <a:fld id="{1CB4F8C3-C35B-45B2-9972-EFDDC647E9A4}" type="datetimeFigureOut">
               <a:rPr lang="en-GB" smtClean="0"/>
-              <a:t>03/06/2022</a:t>
+              <a:t>07/06/2022</a:t>
             </a:fld>
             <a:endParaRPr lang="en-GB"/>
           </a:p>
@@ -4097,7 +4097,7 @@
           <a:p>
             <a:fld id="{1CB4F8C3-C35B-45B2-9972-EFDDC647E9A4}" type="datetimeFigureOut">
               <a:rPr lang="en-GB" smtClean="0"/>
-              <a:t>03/06/2022</a:t>
+              <a:t>07/06/2022</a:t>
             </a:fld>
             <a:endParaRPr lang="en-GB"/>
           </a:p>
@@ -4512,7 +4512,7 @@
           <a:p>
             <a:fld id="{1CB4F8C3-C35B-45B2-9972-EFDDC647E9A4}" type="datetimeFigureOut">
               <a:rPr lang="en-GB" smtClean="0"/>
-              <a:t>03/06/2022</a:t>
+              <a:t>07/06/2022</a:t>
             </a:fld>
             <a:endParaRPr lang="en-GB"/>
           </a:p>
@@ -4654,7 +4654,7 @@
           <a:p>
             <a:fld id="{1CB4F8C3-C35B-45B2-9972-EFDDC647E9A4}" type="datetimeFigureOut">
               <a:rPr lang="en-GB" smtClean="0"/>
-              <a:t>03/06/2022</a:t>
+              <a:t>07/06/2022</a:t>
             </a:fld>
             <a:endParaRPr lang="en-GB"/>
           </a:p>
@@ -4767,7 +4767,7 @@
           <a:p>
             <a:fld id="{1CB4F8C3-C35B-45B2-9972-EFDDC647E9A4}" type="datetimeFigureOut">
               <a:rPr lang="en-GB" smtClean="0"/>
-              <a:t>03/06/2022</a:t>
+              <a:t>07/06/2022</a:t>
             </a:fld>
             <a:endParaRPr lang="en-GB"/>
           </a:p>
@@ -5080,7 +5080,7 @@
           <a:p>
             <a:fld id="{1CB4F8C3-C35B-45B2-9972-EFDDC647E9A4}" type="datetimeFigureOut">
               <a:rPr lang="en-GB" smtClean="0"/>
-              <a:t>03/06/2022</a:t>
+              <a:t>07/06/2022</a:t>
             </a:fld>
             <a:endParaRPr lang="en-GB"/>
           </a:p>
@@ -5369,7 +5369,7 @@
           <a:p>
             <a:fld id="{1CB4F8C3-C35B-45B2-9972-EFDDC647E9A4}" type="datetimeFigureOut">
               <a:rPr lang="en-GB" smtClean="0"/>
-              <a:t>03/06/2022</a:t>
+              <a:t>07/06/2022</a:t>
             </a:fld>
             <a:endParaRPr lang="en-GB"/>
           </a:p>
@@ -5612,7 +5612,7 @@
           <a:p>
             <a:fld id="{1CB4F8C3-C35B-45B2-9972-EFDDC647E9A4}" type="datetimeFigureOut">
               <a:rPr lang="en-GB" smtClean="0"/>
-              <a:t>03/06/2022</a:t>
+              <a:t>07/06/2022</a:t>
             </a:fld>
             <a:endParaRPr lang="en-GB"/>
           </a:p>
@@ -6178,7 +6178,7 @@
           <a:p>
             <a:fld id="{6C21EC1F-9507-4D27-9C64-015C1F72ED4D}" type="datetimeFigureOut">
               <a:rPr lang="en-GB" smtClean="0"/>
-              <a:t>03/06/2022</a:t>
+              <a:t>07/06/2022</a:t>
             </a:fld>
             <a:endParaRPr lang="en-GB"/>
           </a:p>
@@ -20640,13 +20640,13 @@
           <a:p>
             <a:r>
               <a:rPr lang="en-GB" dirty="0"/>
-              <a:t>We will have a much smaller dataset called the training set. This set is used to evaluate the performance of the neural network on data it has never seen before.</a:t>
+              <a:t>We will have a much smaller dataset called the testing set. This set is used to evaluate the performance of the neural network on data it has never seen before.</a:t>
             </a:r>
           </a:p>
           <a:p>
             <a:r>
               <a:rPr lang="en-GB" dirty="0"/>
-              <a:t>We will also have a validation dataset. This serves a very similar purpose to the training set. However, as programmers, we will typically tweak our models after seeing the training score. We only ever use a validation set once – at the very end of training to provide a truly non-biased idea of the AI’s performance on data never seen.</a:t>
+              <a:t>We will also have a validation dataset. This serves a very similar purpose to the testing set. However, as programmers, we will typically tweak our models after seeing the training score. We only ever use a validation set once – at the very end of training to provide a truly non-biased idea of the AI’s performance on data never seen.</a:t>
             </a:r>
           </a:p>
           <a:p>
@@ -20669,9 +20669,10 @@
           </a:p>
           <a:p>
             <a:r>
-              <a:rPr lang="en-GB" dirty="0"/>
+              <a:rPr lang="en-GB"/>
               <a:t>5,000 validation images</a:t>
             </a:r>
+            <a:endParaRPr lang="en-GB" dirty="0"/>
           </a:p>
         </p:txBody>
       </p:sp>
@@ -25156,6 +25157,55 @@
                                     <p:set>
                                       <p:cBhvr>
                                         <p:cTn id="14" dur="1" fill="hold">
+                                          <p:stCondLst>
+                                            <p:cond delay="0"/>
+                                          </p:stCondLst>
+                                        </p:cTn>
+                                        <p:tgtEl>
+                                          <p:spTgt spid="3">
+                                            <p:txEl>
+                                              <p:pRg st="2" end="2"/>
+                                            </p:txEl>
+                                          </p:spTgt>
+                                        </p:tgtEl>
+                                        <p:attrNameLst>
+                                          <p:attrName>style.visibility</p:attrName>
+                                        </p:attrNameLst>
+                                      </p:cBhvr>
+                                      <p:to>
+                                        <p:strVal val="visible"/>
+                                      </p:to>
+                                    </p:set>
+                                  </p:childTnLst>
+                                </p:cTn>
+                              </p:par>
+                            </p:childTnLst>
+                          </p:cTn>
+                        </p:par>
+                      </p:childTnLst>
+                    </p:cTn>
+                  </p:par>
+                  <p:par>
+                    <p:cTn id="15" fill="hold">
+                      <p:stCondLst>
+                        <p:cond delay="indefinite"/>
+                      </p:stCondLst>
+                      <p:childTnLst>
+                        <p:par>
+                          <p:cTn id="16" fill="hold">
+                            <p:stCondLst>
+                              <p:cond delay="0"/>
+                            </p:stCondLst>
+                            <p:childTnLst>
+                              <p:par>
+                                <p:cTn id="17" presetID="1" presetClass="entr" presetSubtype="0" fill="hold" nodeType="clickEffect">
+                                  <p:stCondLst>
+                                    <p:cond delay="0"/>
+                                  </p:stCondLst>
+                                  <p:childTnLst>
+                                    <p:set>
+                                      <p:cBhvr>
+                                        <p:cTn id="18" dur="1" fill="hold">
                                           <p:stCondLst>
                                             <p:cond delay="0"/>
                                           </p:stCondLst>

</xml_diff>